<commit_message>
Respect HTTP Standard Authorization header
</commit_message>
<xml_diff>
--- a/src/main/doc/security-stateless.pptx
+++ b/src/main/doc/security-stateless.pptx
@@ -10,6 +10,7 @@
     <p:sldId id="258" r:id="rId4"/>
     <p:sldId id="261" r:id="rId5"/>
     <p:sldId id="262" r:id="rId6"/>
+    <p:sldId id="263" r:id="rId7"/>
   </p:sldIdLst>
   <p:sldSz cx="9144000" cy="6858000" type="screen4x3"/>
   <p:notesSz cx="6858000" cy="9144000"/>
@@ -3644,11 +3645,7 @@
             </a:r>
             <a:r>
               <a:rPr lang="en-US" dirty="0" err="1" smtClean="0"/>
-              <a:t>co</a:t>
-            </a:r>
-            <a:r>
-              <a:rPr lang="en-US" dirty="0" err="1" smtClean="0"/>
-              <a:t>ûteuse</a:t>
+              <a:t>coûteuse</a:t>
             </a:r>
             <a:r>
               <a:rPr lang="en-US" dirty="0" smtClean="0"/>
@@ -3680,11 +3677,7 @@
             </a:r>
             <a:r>
               <a:rPr lang="en-US" dirty="0" err="1" smtClean="0"/>
-              <a:t>principalemen</a:t>
-            </a:r>
-            <a:r>
-              <a:rPr lang="en-US" dirty="0" err="1" smtClean="0"/>
-              <a:t>t</a:t>
+              <a:t>principalement</a:t>
             </a:r>
             <a:r>
               <a:rPr lang="en-US" dirty="0" smtClean="0"/>
@@ -4317,11 +4310,7 @@
             </a:r>
             <a:r>
               <a:rPr lang="en-US" dirty="0" err="1" smtClean="0"/>
-              <a:t>requ</a:t>
-            </a:r>
-            <a:r>
-              <a:rPr lang="en-US" dirty="0" err="1" smtClean="0"/>
-              <a:t>ête</a:t>
+              <a:t>requête</a:t>
             </a:r>
             <a:r>
               <a:rPr lang="en-US" dirty="0" smtClean="0"/>
@@ -4455,11 +4444,7 @@
             </a:r>
             <a:r>
               <a:rPr lang="en-US" b="0" dirty="0" err="1" smtClean="0"/>
-              <a:t>contr</a:t>
-            </a:r>
-            <a:r>
-              <a:rPr lang="en-US" b="0" dirty="0" err="1" smtClean="0"/>
-              <a:t>ôleur</a:t>
+              <a:t>contrôleur</a:t>
             </a:r>
             <a:r>
               <a:rPr lang="en-US" b="0" dirty="0" smtClean="0"/>
@@ -4467,11 +4452,7 @@
             </a:r>
             <a:r>
               <a:rPr lang="en-US" b="0" dirty="0" err="1" smtClean="0"/>
-              <a:t>composant</a:t>
-            </a:r>
-            <a:r>
-              <a:rPr lang="en-US" b="0" dirty="0" err="1" smtClean="0"/>
-              <a:t>s</a:t>
+              <a:t>composants</a:t>
             </a:r>
             <a:r>
               <a:rPr lang="en-US" b="0" dirty="0"/>
@@ -4481,7 +4462,6 @@
               <a:rPr lang="en-US" b="0" dirty="0" smtClean="0"/>
               <a:t>: </a:t>
             </a:r>
-            <a:endParaRPr lang="en-US" b="0" dirty="0" smtClean="0"/>
           </a:p>
           <a:p>
             <a:pPr marL="342900" indent="-342900">
@@ -4776,11 +4756,7 @@
             </a:r>
             <a:r>
               <a:rPr lang="en-US" b="0" dirty="0" err="1" smtClean="0"/>
-              <a:t>c</a:t>
-            </a:r>
-            <a:r>
-              <a:rPr lang="en-US" b="0" dirty="0" err="1" smtClean="0"/>
-              <a:t>ôté</a:t>
+              <a:t>côté</a:t>
             </a:r>
             <a:r>
               <a:rPr lang="en-US" b="0" dirty="0" smtClean="0"/>
@@ -4924,11 +4900,7 @@
             </a:r>
             <a:r>
               <a:rPr lang="en-US" b="0" dirty="0" smtClean="0"/>
-              <a:t>TOKEN”</a:t>
-            </a:r>
-            <a:r>
-              <a:rPr lang="en-US" b="0" dirty="0" smtClean="0"/>
-              <a:t> </a:t>
+              <a:t>TOKEN” </a:t>
             </a:r>
             <a:r>
               <a:rPr lang="en-US" b="0" dirty="0" err="1" smtClean="0"/>
@@ -4969,6 +4941,288 @@
     <p:extLst>
       <p:ext uri="{BB962C8B-B14F-4D97-AF65-F5344CB8AC3E}">
         <p14:creationId xmlns:p14="http://schemas.microsoft.com/office/powerpoint/2010/main" val="1372614154"/>
+      </p:ext>
+    </p:extLst>
+  </p:cSld>
+  <p:clrMapOvr>
+    <a:masterClrMapping/>
+  </p:clrMapOvr>
+</p:sld>
+</file>
+
+<file path=ppt/slides/slide6.xml><?xml version="1.0" encoding="utf-8"?>
+<p:sld xmlns:a="http://schemas.openxmlformats.org/drawingml/2006/main" xmlns:r="http://schemas.openxmlformats.org/officeDocument/2006/relationships" xmlns:p="http://schemas.openxmlformats.org/presentationml/2006/main">
+  <p:cSld>
+    <p:spTree>
+      <p:nvGrpSpPr>
+        <p:cNvPr id="1" name=""/>
+        <p:cNvGrpSpPr/>
+        <p:nvPr/>
+      </p:nvGrpSpPr>
+      <p:grpSpPr>
+        <a:xfrm>
+          <a:off x="0" y="0"/>
+          <a:ext cx="0" cy="0"/>
+          <a:chOff x="0" y="0"/>
+          <a:chExt cx="0" cy="0"/>
+        </a:xfrm>
+      </p:grpSpPr>
+      <p:sp>
+        <p:nvSpPr>
+          <p:cNvPr id="2" name="Titre 1"/>
+          <p:cNvSpPr>
+            <a:spLocks noGrp="1"/>
+          </p:cNvSpPr>
+          <p:nvPr>
+            <p:ph type="title"/>
+          </p:nvPr>
+        </p:nvSpPr>
+        <p:spPr/>
+        <p:txBody>
+          <a:bodyPr/>
+          <a:lstStyle/>
+          <a:p>
+            <a:r>
+              <a:rPr lang="en-US" dirty="0" err="1" smtClean="0"/>
+              <a:t>Securite</a:t>
+            </a:r>
+            <a:r>
+              <a:rPr lang="en-US" dirty="0" smtClean="0"/>
+              <a:t/>
+            </a:r>
+            <a:br>
+              <a:rPr lang="en-US" dirty="0" smtClean="0"/>
+            </a:br>
+            <a:r>
+              <a:rPr lang="en-US" dirty="0" smtClean="0"/>
+              <a:t>“Keep in mind”</a:t>
+            </a:r>
+            <a:endParaRPr lang="en-US" dirty="0"/>
+          </a:p>
+        </p:txBody>
+      </p:sp>
+      <p:sp>
+        <p:nvSpPr>
+          <p:cNvPr id="3" name="Espace réservé du contenu 2"/>
+          <p:cNvSpPr>
+            <a:spLocks noGrp="1"/>
+          </p:cNvSpPr>
+          <p:nvPr>
+            <p:ph idx="1"/>
+          </p:nvPr>
+        </p:nvSpPr>
+        <p:spPr/>
+        <p:txBody>
+          <a:bodyPr>
+            <a:normAutofit fontScale="85000" lnSpcReduction="20000"/>
+          </a:bodyPr>
+          <a:lstStyle/>
+          <a:p>
+            <a:pPr marL="342900" indent="-342900">
+              <a:buFont typeface="Arial"/>
+              <a:buChar char="•"/>
+            </a:pPr>
+            <a:r>
+              <a:rPr lang="en-US" dirty="0" smtClean="0"/>
+              <a:t>CSRF </a:t>
+            </a:r>
+            <a:r>
+              <a:rPr lang="en-US" dirty="0"/>
+              <a:t>: Cross-Site Request </a:t>
+            </a:r>
+            <a:r>
+              <a:rPr lang="en-US" dirty="0" smtClean="0"/>
+              <a:t>Forgery</a:t>
+            </a:r>
+          </a:p>
+          <a:p>
+            <a:pPr marL="342900" indent="-342900">
+              <a:buFont typeface="Arial"/>
+              <a:buChar char="•"/>
+            </a:pPr>
+            <a:r>
+              <a:rPr lang="en-US" dirty="0" smtClean="0"/>
+              <a:t>Token </a:t>
+            </a:r>
+            <a:r>
+              <a:rPr lang="en-US" dirty="0" err="1" smtClean="0"/>
+              <a:t>doit</a:t>
+            </a:r>
+            <a:r>
+              <a:rPr lang="en-US" dirty="0" smtClean="0"/>
+              <a:t> expirer (environ 7 </a:t>
+            </a:r>
+            <a:r>
+              <a:rPr lang="en-US" dirty="0" err="1" smtClean="0"/>
+              <a:t>jours</a:t>
+            </a:r>
+            <a:r>
+              <a:rPr lang="en-US" dirty="0" smtClean="0"/>
+              <a:t>)</a:t>
+            </a:r>
+          </a:p>
+          <a:p>
+            <a:pPr marL="342900" indent="-342900">
+              <a:buFont typeface="Arial"/>
+              <a:buChar char="•"/>
+            </a:pPr>
+            <a:r>
+              <a:rPr lang="en-US" dirty="0" smtClean="0"/>
+              <a:t>Rest API </a:t>
+            </a:r>
+            <a:r>
+              <a:rPr lang="en-US" dirty="0" err="1" smtClean="0"/>
+              <a:t>doit</a:t>
+            </a:r>
+            <a:r>
+              <a:rPr lang="en-US" dirty="0" smtClean="0"/>
+              <a:t> </a:t>
+            </a:r>
+            <a:r>
+              <a:rPr lang="en-US" dirty="0" err="1" smtClean="0"/>
+              <a:t>garder</a:t>
+            </a:r>
+            <a:r>
+              <a:rPr lang="en-US" dirty="0" smtClean="0"/>
+              <a:t> le standard HTTP header “Authorization”</a:t>
+            </a:r>
+          </a:p>
+          <a:p>
+            <a:pPr marL="342900" indent="-342900">
+              <a:buFont typeface="Arial"/>
+              <a:buChar char="•"/>
+            </a:pPr>
+            <a:r>
+              <a:rPr lang="en-US" dirty="0" smtClean="0"/>
+              <a:t>Ne </a:t>
+            </a:r>
+            <a:r>
+              <a:rPr lang="en-US" dirty="0" err="1" smtClean="0"/>
+              <a:t>jamais</a:t>
+            </a:r>
+            <a:r>
+              <a:rPr lang="en-US" dirty="0" smtClean="0"/>
+              <a:t> stocker un token </a:t>
+            </a:r>
+            <a:r>
+              <a:rPr lang="en-US" dirty="0" err="1" smtClean="0"/>
+              <a:t>tel</a:t>
+            </a:r>
+            <a:r>
+              <a:rPr lang="en-US" dirty="0" smtClean="0"/>
+              <a:t> </a:t>
+            </a:r>
+            <a:r>
+              <a:rPr lang="en-US" dirty="0" err="1" smtClean="0"/>
+              <a:t>quel</a:t>
+            </a:r>
+            <a:r>
+              <a:rPr lang="en-US" dirty="0" smtClean="0"/>
+              <a:t> </a:t>
+            </a:r>
+            <a:r>
+              <a:rPr lang="en-US" dirty="0" err="1" smtClean="0"/>
+              <a:t>sur</a:t>
+            </a:r>
+            <a:r>
+              <a:rPr lang="en-US" dirty="0" smtClean="0"/>
+              <a:t> le </a:t>
+            </a:r>
+            <a:r>
+              <a:rPr lang="en-US" dirty="0" err="1" smtClean="0"/>
+              <a:t>serveur</a:t>
+            </a:r>
+            <a:r>
+              <a:rPr lang="en-US" dirty="0" smtClean="0"/>
+              <a:t> (faire un hash par </a:t>
+            </a:r>
+            <a:r>
+              <a:rPr lang="en-US" dirty="0" err="1" smtClean="0"/>
+              <a:t>exemple</a:t>
+            </a:r>
+            <a:r>
+              <a:rPr lang="en-US" dirty="0" smtClean="0"/>
+              <a:t>)</a:t>
+            </a:r>
+          </a:p>
+          <a:p>
+            <a:pPr marL="342900" indent="-342900">
+              <a:buFont typeface="Arial"/>
+              <a:buChar char="•"/>
+            </a:pPr>
+            <a:r>
+              <a:rPr lang="en-US" dirty="0" smtClean="0"/>
+              <a:t>Token (</a:t>
+            </a:r>
+            <a:r>
+              <a:rPr lang="en-US" dirty="0" err="1" smtClean="0"/>
+              <a:t>règles</a:t>
+            </a:r>
+            <a:r>
+              <a:rPr lang="en-US" dirty="0"/>
+              <a:t>) </a:t>
+            </a:r>
+            <a:r>
+              <a:rPr lang="en-US" dirty="0">
+                <a:hlinkClick r:id="rId2"/>
+              </a:rPr>
+              <a:t>http://security.stackexchange.com/questions/19676/token-based-authentication-securing-the-</a:t>
+            </a:r>
+            <a:r>
+              <a:rPr lang="en-US" dirty="0" smtClean="0">
+                <a:hlinkClick r:id="rId2"/>
+              </a:rPr>
+              <a:t>token</a:t>
+            </a:r>
+            <a:r>
+              <a:rPr lang="en-US" dirty="0" smtClean="0"/>
+              <a:t> </a:t>
+            </a:r>
+          </a:p>
+          <a:p>
+            <a:pPr marL="800100" lvl="1" indent="-342900">
+              <a:buFont typeface="Arial"/>
+              <a:buChar char="•"/>
+            </a:pPr>
+            <a:r>
+              <a:rPr lang="en-US" dirty="0"/>
+              <a:t>Server has a secret key K (a sequence of, say, 128 bits, produced by a cryptographically secure PRNG)</a:t>
+            </a:r>
+            <a:r>
+              <a:rPr lang="en-US" dirty="0" smtClean="0"/>
+              <a:t>.</a:t>
+            </a:r>
+          </a:p>
+          <a:p>
+            <a:pPr marL="800100" lvl="1" indent="-342900">
+              <a:buFont typeface="Arial"/>
+              <a:buChar char="•"/>
+            </a:pPr>
+            <a:r>
+              <a:rPr lang="en-US" dirty="0"/>
+              <a:t>A token contains the user name (U), the time of issuance (T), and a keyed integrity check computed over U and T (together), keyed with K (by default, use HMAC with SHA-256 or SHA-1)</a:t>
+            </a:r>
+            <a:r>
+              <a:rPr lang="en-US" dirty="0" smtClean="0"/>
+              <a:t>.</a:t>
+            </a:r>
+          </a:p>
+          <a:p>
+            <a:pPr marL="800100" lvl="1" indent="-342900">
+              <a:buFont typeface="Arial"/>
+              <a:buChar char="•"/>
+            </a:pPr>
+            <a:r>
+              <a:rPr lang="en-US" dirty="0"/>
+              <a:t>Thanks to his knowledge of K, the server can verify that a given token, sent back by the user, is one of its owns or not; but the attacker cannot forge such tokens.</a:t>
+            </a:r>
+          </a:p>
+        </p:txBody>
+      </p:sp>
+    </p:spTree>
+    <p:extLst>
+      <p:ext uri="{BB962C8B-B14F-4D97-AF65-F5344CB8AC3E}">
+        <p14:creationId xmlns:p14="http://schemas.microsoft.com/office/powerpoint/2010/main" val="3848552185"/>
       </p:ext>
     </p:extLst>
   </p:cSld>

</xml_diff>